<commit_message>
Commited cucumber runner class code
</commit_message>
<xml_diff>
--- a/CucumberPPT.pptx
+++ b/CucumberPPT.pptx
@@ -22,9 +22,9 @@
     <p:sldId id="268" r:id="rId16"/>
     <p:sldId id="269" r:id="rId17"/>
     <p:sldId id="272" r:id="rId18"/>
-    <p:sldId id="271" r:id="rId19"/>
+    <p:sldId id="276" r:id="rId19"/>
     <p:sldId id="270" r:id="rId20"/>
-    <p:sldId id="265" r:id="rId21"/>
+    <p:sldId id="271" r:id="rId21"/>
   </p:sldIdLst>
   <p:sldSz cx="12192000" cy="6858000"/>
   <p:notesSz cx="6858000" cy="9144000"/>
@@ -854,7 +854,7 @@
             <a:fld id="{B61BEF0D-F0BB-DE4B-95CE-6DB70DBA9567}" type="datetimeFigureOut">
               <a:rPr lang="en-US" dirty="0"/>
               <a:pPr/>
-              <a:t>4/21/2020</a:t>
+              <a:t>4/25/2020</a:t>
             </a:fld>
             <a:endParaRPr lang="en-US" dirty="0"/>
           </a:p>
@@ -1102,7 +1102,7 @@
             <a:fld id="{B61BEF0D-F0BB-DE4B-95CE-6DB70DBA9567}" type="datetimeFigureOut">
               <a:rPr lang="en-US" dirty="0"/>
               <a:pPr/>
-              <a:t>4/21/2020</a:t>
+              <a:t>4/25/2020</a:t>
             </a:fld>
             <a:endParaRPr lang="en-US" dirty="0"/>
           </a:p>
@@ -1413,7 +1413,7 @@
             <a:fld id="{B61BEF0D-F0BB-DE4B-95CE-6DB70DBA9567}" type="datetimeFigureOut">
               <a:rPr lang="en-US" dirty="0"/>
               <a:pPr/>
-              <a:t>4/21/2020</a:t>
+              <a:t>4/25/2020</a:t>
             </a:fld>
             <a:endParaRPr lang="en-US" dirty="0"/>
           </a:p>
@@ -1751,7 +1751,7 @@
             <a:fld id="{B61BEF0D-F0BB-DE4B-95CE-6DB70DBA9567}" type="datetimeFigureOut">
               <a:rPr lang="en-US" dirty="0"/>
               <a:pPr/>
-              <a:t>4/21/2020</a:t>
+              <a:t>4/25/2020</a:t>
             </a:fld>
             <a:endParaRPr lang="en-US" dirty="0"/>
           </a:p>
@@ -2062,7 +2062,7 @@
             <a:fld id="{B61BEF0D-F0BB-DE4B-95CE-6DB70DBA9567}" type="datetimeFigureOut">
               <a:rPr lang="en-US" dirty="0"/>
               <a:pPr/>
-              <a:t>4/21/2020</a:t>
+              <a:t>4/25/2020</a:t>
             </a:fld>
             <a:endParaRPr lang="en-US" dirty="0"/>
           </a:p>
@@ -2452,7 +2452,7 @@
             <a:fld id="{B61BEF0D-F0BB-DE4B-95CE-6DB70DBA9567}" type="datetimeFigureOut">
               <a:rPr lang="en-US" dirty="0"/>
               <a:pPr/>
-              <a:t>4/21/2020</a:t>
+              <a:t>4/25/2020</a:t>
             </a:fld>
             <a:endParaRPr lang="en-US" dirty="0"/>
           </a:p>
@@ -2618,7 +2618,7 @@
           <a:p>
             <a:fld id="{55C6B4A9-1611-4792-9094-5F34BCA07E0B}" type="datetimeFigureOut">
               <a:rPr lang="en-US" dirty="0"/>
-              <a:t>4/21/2020</a:t>
+              <a:t>4/25/2020</a:t>
             </a:fld>
             <a:endParaRPr lang="en-US" dirty="0"/>
           </a:p>
@@ -2794,7 +2794,7 @@
             <a:fld id="{B61BEF0D-F0BB-DE4B-95CE-6DB70DBA9567}" type="datetimeFigureOut">
               <a:rPr lang="en-US" dirty="0"/>
               <a:pPr/>
-              <a:t>4/21/2020</a:t>
+              <a:t>4/25/2020</a:t>
             </a:fld>
             <a:endParaRPr lang="en-US" dirty="0"/>
           </a:p>
@@ -2967,7 +2967,7 @@
             <a:fld id="{B61BEF0D-F0BB-DE4B-95CE-6DB70DBA9567}" type="datetimeFigureOut">
               <a:rPr lang="en-US" dirty="0"/>
               <a:pPr/>
-              <a:t>4/21/2020</a:t>
+              <a:t>4/25/2020</a:t>
             </a:fld>
             <a:endParaRPr lang="en-US" dirty="0"/>
           </a:p>
@@ -3211,7 +3211,7 @@
             <a:fld id="{B61BEF0D-F0BB-DE4B-95CE-6DB70DBA9567}" type="datetimeFigureOut">
               <a:rPr lang="en-US" dirty="0"/>
               <a:pPr/>
-              <a:t>4/21/2020</a:t>
+              <a:t>4/25/2020</a:t>
             </a:fld>
             <a:endParaRPr lang="en-US" dirty="0"/>
           </a:p>
@@ -3439,7 +3439,7 @@
           <a:p>
             <a:fld id="{EB712588-04B1-427B-82EE-E8DB90309F08}" type="datetimeFigureOut">
               <a:rPr lang="en-US" dirty="0"/>
-              <a:t>4/21/2020</a:t>
+              <a:t>4/25/2020</a:t>
             </a:fld>
             <a:endParaRPr lang="en-US" dirty="0"/>
           </a:p>
@@ -3809,7 +3809,7 @@
             <a:fld id="{B61BEF0D-F0BB-DE4B-95CE-6DB70DBA9567}" type="datetimeFigureOut">
               <a:rPr lang="en-US" dirty="0"/>
               <a:pPr/>
-              <a:t>4/21/2020</a:t>
+              <a:t>4/25/2020</a:t>
             </a:fld>
             <a:endParaRPr lang="en-US" dirty="0"/>
           </a:p>
@@ -3929,7 +3929,7 @@
             <a:fld id="{B61BEF0D-F0BB-DE4B-95CE-6DB70DBA9567}" type="datetimeFigureOut">
               <a:rPr lang="en-US" dirty="0"/>
               <a:pPr/>
-              <a:t>4/21/2020</a:t>
+              <a:t>4/25/2020</a:t>
             </a:fld>
             <a:endParaRPr lang="en-US" dirty="0"/>
           </a:p>
@@ -4021,7 +4021,7 @@
             <a:fld id="{B61BEF0D-F0BB-DE4B-95CE-6DB70DBA9567}" type="datetimeFigureOut">
               <a:rPr lang="en-US" dirty="0"/>
               <a:pPr/>
-              <a:t>4/21/2020</a:t>
+              <a:t>4/25/2020</a:t>
             </a:fld>
             <a:endParaRPr lang="en-US" dirty="0"/>
           </a:p>
@@ -4272,7 +4272,7 @@
           <a:p>
             <a:fld id="{42A54C80-263E-416B-A8E0-580EDEADCBDC}" type="datetimeFigureOut">
               <a:rPr lang="en-US" dirty="0"/>
-              <a:t>4/21/2020</a:t>
+              <a:t>4/25/2020</a:t>
             </a:fld>
             <a:endParaRPr lang="en-US" dirty="0"/>
           </a:p>
@@ -4531,7 +4531,7 @@
             <a:fld id="{B61BEF0D-F0BB-DE4B-95CE-6DB70DBA9567}" type="datetimeFigureOut">
               <a:rPr lang="en-US" dirty="0"/>
               <a:pPr/>
-              <a:t>4/21/2020</a:t>
+              <a:t>4/25/2020</a:t>
             </a:fld>
             <a:endParaRPr lang="en-US" dirty="0"/>
           </a:p>
@@ -5271,7 +5271,7 @@
             <a:fld id="{B61BEF0D-F0BB-DE4B-95CE-6DB70DBA9567}" type="datetimeFigureOut">
               <a:rPr lang="en-US" dirty="0"/>
               <a:pPr/>
-              <a:t>4/21/2020</a:t>
+              <a:t>4/25/2020</a:t>
             </a:fld>
             <a:endParaRPr lang="en-US" dirty="0"/>
           </a:p>
@@ -10056,14 +10056,14 @@
             <a:pPr lvl="1" fontAlgn="base"/>
             <a:r>
               <a:rPr lang="en-GB" sz="1400" dirty="0"/>
+              <a:t>In Step Definition classes</a:t>
+            </a:r>
+          </a:p>
+          <a:p>
+            <a:pPr lvl="1" fontAlgn="base"/>
+            <a:r>
+              <a:rPr lang="en-GB" sz="1400" dirty="0"/>
               <a:t>In a separate class</a:t>
-            </a:r>
-          </a:p>
-          <a:p>
-            <a:pPr lvl="1" fontAlgn="base"/>
-            <a:r>
-              <a:rPr lang="en-GB" dirty="0"/>
-              <a:t>In Step Definition classes</a:t>
             </a:r>
           </a:p>
           <a:p>
@@ -10170,12 +10170,12 @@
         <p:spPr>
           <a:xfrm>
             <a:off x="677334" y="893135"/>
-            <a:ext cx="8596668" cy="5148227"/>
+            <a:ext cx="8596668" cy="5964865"/>
           </a:xfrm>
         </p:spPr>
         <p:txBody>
           <a:bodyPr>
-            <a:normAutofit/>
+            <a:normAutofit lnSpcReduction="10000"/>
           </a:bodyPr>
           <a:lstStyle/>
           <a:p>
@@ -10184,6 +10184,187 @@
               <a:rPr lang="en-GB" sz="1600" dirty="0"/>
               <a:t>What are tags in Cucumber?</a:t>
             </a:r>
+          </a:p>
+          <a:p>
+            <a:pPr lvl="1" fontAlgn="base"/>
+            <a:r>
+              <a:rPr lang="en-GB" sz="1400" dirty="0"/>
+              <a:t>We use @ followed by tag name to tag a scenario/Feature</a:t>
+            </a:r>
+          </a:p>
+          <a:p>
+            <a:pPr lvl="1" fontAlgn="base"/>
+            <a:r>
+              <a:rPr lang="en-GB" sz="1400" dirty="0"/>
+              <a:t>Example tags</a:t>
+            </a:r>
+          </a:p>
+          <a:p>
+            <a:pPr lvl="2" fontAlgn="base"/>
+            <a:r>
+              <a:rPr lang="en-GB" sz="1200" dirty="0"/>
+              <a:t>@</a:t>
+            </a:r>
+            <a:r>
+              <a:rPr lang="en-GB" sz="1200" dirty="0" err="1"/>
+              <a:t>SmokeTest</a:t>
+            </a:r>
+            <a:endParaRPr lang="en-GB" sz="1200" dirty="0"/>
+          </a:p>
+          <a:p>
+            <a:pPr lvl="2" fontAlgn="base"/>
+            <a:r>
+              <a:rPr lang="en-GB" sz="1200" dirty="0"/>
+              <a:t>@</a:t>
+            </a:r>
+            <a:r>
+              <a:rPr lang="en-GB" sz="1200" dirty="0" err="1"/>
+              <a:t>RegressionTest</a:t>
+            </a:r>
+            <a:endParaRPr lang="en-GB" sz="1200" dirty="0"/>
+          </a:p>
+          <a:p>
+            <a:pPr lvl="2" fontAlgn="base"/>
+            <a:r>
+              <a:rPr lang="en-GB" sz="1200" dirty="0"/>
+              <a:t>@</a:t>
+            </a:r>
+            <a:r>
+              <a:rPr lang="en-GB" sz="1200" dirty="0" err="1"/>
+              <a:t>SystemTest</a:t>
+            </a:r>
+            <a:endParaRPr lang="en-GB" sz="1200" dirty="0"/>
+          </a:p>
+          <a:p>
+            <a:pPr lvl="2" fontAlgn="base"/>
+            <a:r>
+              <a:rPr lang="en-GB" sz="1200" dirty="0"/>
+              <a:t>@Search</a:t>
+            </a:r>
+          </a:p>
+          <a:p>
+            <a:pPr lvl="2" fontAlgn="base"/>
+            <a:r>
+              <a:rPr lang="en-GB" sz="1200" dirty="0"/>
+              <a:t>@Cart</a:t>
+            </a:r>
+          </a:p>
+          <a:p>
+            <a:pPr lvl="2" fontAlgn="base"/>
+            <a:r>
+              <a:rPr lang="en-GB" sz="1200" dirty="0"/>
+              <a:t>@</a:t>
+            </a:r>
+            <a:r>
+              <a:rPr lang="en-GB" sz="1200" dirty="0" err="1"/>
+              <a:t>SmokeTest</a:t>
+            </a:r>
+            <a:r>
+              <a:rPr lang="en-GB" sz="1200" dirty="0"/>
+              <a:t> @</a:t>
+            </a:r>
+            <a:r>
+              <a:rPr lang="en-GB" sz="1200" dirty="0" err="1"/>
+              <a:t>SystemTest</a:t>
+            </a:r>
+            <a:endParaRPr lang="en-GB" sz="1200" dirty="0"/>
+          </a:p>
+          <a:p>
+            <a:pPr lvl="2" fontAlgn="base"/>
+            <a:r>
+              <a:rPr lang="en-GB" sz="1200" dirty="0"/>
+              <a:t>@Search @</a:t>
+            </a:r>
+            <a:r>
+              <a:rPr lang="en-GB" sz="1200" dirty="0" err="1"/>
+              <a:t>SystemTest</a:t>
+            </a:r>
+            <a:endParaRPr lang="en-GB" sz="1200" dirty="0"/>
+          </a:p>
+          <a:p>
+            <a:pPr lvl="1" fontAlgn="base"/>
+            <a:r>
+              <a:rPr lang="en-GB" sz="1400" dirty="0"/>
+              <a:t>Tag names are not built in Cucumber keywords. You can use logical names based on your need</a:t>
+            </a:r>
+          </a:p>
+          <a:p>
+            <a:pPr lvl="1" fontAlgn="base"/>
+            <a:r>
+              <a:rPr lang="en-GB" sz="1400" dirty="0"/>
+              <a:t>A feature/scenario can be tagged with multiple tags</a:t>
+            </a:r>
+          </a:p>
+          <a:p>
+            <a:pPr lvl="1" fontAlgn="base"/>
+            <a:r>
+              <a:rPr lang="en-GB" sz="1400" dirty="0"/>
+              <a:t>If we tag a feature, then all the scenarios present in that feature file inherit that tag</a:t>
+            </a:r>
+          </a:p>
+          <a:p>
+            <a:pPr lvl="1" fontAlgn="base"/>
+            <a:r>
+              <a:rPr lang="en-GB" sz="1400" dirty="0"/>
+              <a:t>Use of tags:</a:t>
+            </a:r>
+          </a:p>
+          <a:p>
+            <a:pPr lvl="2" fontAlgn="base"/>
+            <a:r>
+              <a:rPr lang="en-GB" sz="1200" dirty="0"/>
+              <a:t>Tags are a way of grouping scenarios</a:t>
+            </a:r>
+          </a:p>
+          <a:p>
+            <a:pPr lvl="2" fontAlgn="base"/>
+            <a:r>
+              <a:rPr lang="en-GB" sz="1200" dirty="0"/>
+              <a:t>When we execute scenarios, we can choose which tests to execute using tag names.</a:t>
+            </a:r>
+          </a:p>
+          <a:p>
+            <a:pPr lvl="2" fontAlgn="base"/>
+            <a:r>
+              <a:rPr lang="en-GB" sz="1200" dirty="0"/>
+              <a:t>For Ex:</a:t>
+            </a:r>
+          </a:p>
+          <a:p>
+            <a:pPr lvl="3" fontAlgn="base"/>
+            <a:r>
+              <a:rPr lang="en-GB" sz="1000" dirty="0"/>
+              <a:t> Only scenarios tagged as @</a:t>
+            </a:r>
+            <a:r>
+              <a:rPr lang="en-GB" sz="1000" dirty="0" err="1"/>
+              <a:t>SmokeTest</a:t>
+            </a:r>
+            <a:endParaRPr lang="en-GB" sz="1000" dirty="0"/>
+          </a:p>
+          <a:p>
+            <a:pPr lvl="3" fontAlgn="base"/>
+            <a:r>
+              <a:rPr lang="en-GB" sz="1000" dirty="0"/>
+              <a:t>Scenarios tagged as both @</a:t>
+            </a:r>
+            <a:r>
+              <a:rPr lang="en-GB" sz="1000" dirty="0" err="1"/>
+              <a:t>IntegrationTest</a:t>
+            </a:r>
+            <a:r>
+              <a:rPr lang="en-GB" sz="1000" dirty="0"/>
+              <a:t> and @</a:t>
+            </a:r>
+            <a:r>
+              <a:rPr lang="en-GB" sz="1000" dirty="0" err="1"/>
+              <a:t>SystemTest</a:t>
+            </a:r>
+            <a:endParaRPr lang="en-GB" sz="1000" dirty="0"/>
+          </a:p>
+          <a:p>
+            <a:pPr lvl="3" fontAlgn="base"/>
+            <a:endParaRPr lang="en-GB" sz="1000" dirty="0"/>
           </a:p>
           <a:p>
             <a:pPr fontAlgn="base"/>
@@ -10277,7 +10458,7 @@
           <a:p>
             <a:r>
               <a:rPr lang="en-GB" sz="2000" dirty="0"/>
-              <a:t>Cucumber : Runner Class</a:t>
+              <a:t>Cucumber : Tagged Hooks</a:t>
             </a:r>
           </a:p>
         </p:txBody>
@@ -10312,62 +10493,89 @@
           <a:p>
             <a:pPr fontAlgn="base"/>
             <a:r>
+              <a:rPr lang="en-GB" sz="1600" dirty="0"/>
+              <a:t>Step 1: Create hooks</a:t>
+            </a:r>
+          </a:p>
+          <a:p>
+            <a:pPr fontAlgn="base"/>
+            <a:r>
+              <a:rPr lang="en-GB" sz="1600" dirty="0"/>
+              <a:t>Step 2: Tag your features/scenarios</a:t>
+            </a:r>
+          </a:p>
+          <a:p>
+            <a:pPr fontAlgn="base"/>
+            <a:r>
+              <a:rPr lang="en-GB" sz="1600" dirty="0"/>
+              <a:t>Step 3: Now tag your hooks</a:t>
+            </a:r>
+          </a:p>
+          <a:p>
+            <a:pPr lvl="1" fontAlgn="base"/>
+            <a:r>
               <a:rPr lang="en-GB" dirty="0"/>
-              <a:t>What is the Cucumber Test Runner class?</a:t>
+              <a:t>@Before("@</a:t>
+            </a:r>
+            <a:r>
+              <a:rPr lang="en-GB" dirty="0" err="1"/>
+              <a:t>acc</a:t>
+            </a:r>
+            <a:r>
+              <a:rPr lang="en-GB" dirty="0"/>
+              <a:t>")</a:t>
             </a:r>
           </a:p>
           <a:p>
             <a:pPr lvl="1" fontAlgn="base"/>
             <a:r>
               <a:rPr lang="en-GB" dirty="0"/>
-              <a:t>A mechanism/class used to run Cucumber tests</a:t>
+              <a:t>@Before("@</a:t>
+            </a:r>
+            <a:r>
+              <a:rPr lang="en-GB" dirty="0" err="1"/>
+              <a:t>ecom</a:t>
+            </a:r>
+            <a:r>
+              <a:rPr lang="en-GB" dirty="0"/>
+              <a:t>")</a:t>
             </a:r>
           </a:p>
           <a:p>
             <a:pPr lvl="1" fontAlgn="base"/>
             <a:r>
               <a:rPr lang="en-GB" dirty="0"/>
-              <a:t>It’s a class using which we can configure Cucumber test runs</a:t>
+              <a:t>@After("@</a:t>
+            </a:r>
+            <a:r>
+              <a:rPr lang="en-GB" dirty="0" err="1"/>
+              <a:t>ecom</a:t>
+            </a:r>
+            <a:r>
+              <a:rPr lang="en-GB" dirty="0"/>
+              <a:t>")</a:t>
             </a:r>
           </a:p>
           <a:p>
             <a:pPr lvl="1" fontAlgn="base"/>
             <a:r>
               <a:rPr lang="en-GB" dirty="0"/>
-              <a:t>@</a:t>
+              <a:t>@After("@</a:t>
             </a:r>
             <a:r>
               <a:rPr lang="en-GB" dirty="0" err="1"/>
-              <a:t>CucumberOptions</a:t>
-            </a:r>
-            <a:endParaRPr lang="en-GB" dirty="0"/>
-          </a:p>
-          <a:p>
-            <a:pPr lvl="2" fontAlgn="base"/>
+              <a:t>acc</a:t>
+            </a:r>
             <a:r>
               <a:rPr lang="en-GB" dirty="0"/>
-              <a:t>Features</a:t>
-            </a:r>
-          </a:p>
-          <a:p>
-            <a:pPr lvl="2" fontAlgn="base"/>
+              <a:t>")</a:t>
+            </a:r>
+          </a:p>
+          <a:p>
+            <a:pPr fontAlgn="base"/>
             <a:r>
               <a:rPr lang="en-GB" dirty="0"/>
-              <a:t>Glue</a:t>
-            </a:r>
-          </a:p>
-          <a:p>
-            <a:pPr lvl="2" fontAlgn="base"/>
-            <a:r>
-              <a:rPr lang="en-GB" dirty="0"/>
-              <a:t>Plugin</a:t>
-            </a:r>
-          </a:p>
-          <a:p>
-            <a:pPr lvl="2" fontAlgn="base"/>
-            <a:r>
-              <a:rPr lang="en-GB" dirty="0"/>
-              <a:t>tags</a:t>
+              <a:t>When you tag a hook, its gets hooked with scenarios tagged with given tag</a:t>
             </a:r>
           </a:p>
           <a:p>
@@ -10397,7 +10605,7 @@
     </p:spTree>
     <p:extLst>
       <p:ext uri="{BB962C8B-B14F-4D97-AF65-F5344CB8AC3E}">
-        <p14:creationId xmlns:p14="http://schemas.microsoft.com/office/powerpoint/2010/main" val="3364840249"/>
+        <p14:creationId xmlns:p14="http://schemas.microsoft.com/office/powerpoint/2010/main" val="2187517224"/>
       </p:ext>
     </p:extLst>
   </p:cSld>
@@ -10454,7 +10662,7 @@
           <a:p>
             <a:r>
               <a:rPr lang="en-GB" sz="2000" dirty="0"/>
-              <a:t>Cucumber : Tags</a:t>
+              <a:t>Cucumber : Runner Class</a:t>
             </a:r>
           </a:p>
         </p:txBody>
@@ -10488,6 +10696,66 @@
           <a:lstStyle/>
           <a:p>
             <a:pPr fontAlgn="base"/>
+            <a:r>
+              <a:rPr lang="en-GB" dirty="0"/>
+              <a:t>Cucumber makes use of TestNG or Junit for running Cucumber tests</a:t>
+            </a:r>
+          </a:p>
+          <a:p>
+            <a:pPr lvl="1" fontAlgn="base"/>
+            <a:r>
+              <a:rPr lang="en-GB" dirty="0"/>
+              <a:t>Along with cucumber jar, We need:</a:t>
+            </a:r>
+          </a:p>
+          <a:p>
+            <a:pPr lvl="2" fontAlgn="base"/>
+            <a:r>
+              <a:rPr lang="en-GB" dirty="0"/>
+              <a:t>Cucumber-</a:t>
+            </a:r>
+            <a:r>
+              <a:rPr lang="en-GB" dirty="0" err="1"/>
+              <a:t>testng</a:t>
+            </a:r>
+            <a:r>
+              <a:rPr lang="en-GB" dirty="0"/>
+              <a:t> jar (If we want to go with </a:t>
+            </a:r>
+            <a:r>
+              <a:rPr lang="en-GB" dirty="0" err="1"/>
+              <a:t>testng</a:t>
+            </a:r>
+            <a:r>
+              <a:rPr lang="en-GB" dirty="0"/>
+              <a:t>)</a:t>
+            </a:r>
+          </a:p>
+          <a:p>
+            <a:pPr lvl="2" fontAlgn="base"/>
+            <a:r>
+              <a:rPr lang="en-GB" dirty="0"/>
+              <a:t>Cucumber-</a:t>
+            </a:r>
+            <a:r>
+              <a:rPr lang="en-GB" dirty="0" err="1"/>
+              <a:t>junit</a:t>
+            </a:r>
+            <a:r>
+              <a:rPr lang="en-GB" dirty="0"/>
+              <a:t> jar (if we want to got with </a:t>
+            </a:r>
+            <a:r>
+              <a:rPr lang="en-GB" dirty="0" err="1"/>
+              <a:t>jnuit</a:t>
+            </a:r>
+            <a:r>
+              <a:rPr lang="en-GB" dirty="0"/>
+              <a:t>)</a:t>
+            </a:r>
+          </a:p>
+          <a:p>
+            <a:pPr lvl="1" fontAlgn="base"/>
             <a:endParaRPr lang="en-GB" dirty="0"/>
           </a:p>
           <a:p>
@@ -11670,10 +11938,10 @@
       </p:grpSpPr>
       <p:sp>
         <p:nvSpPr>
-          <p:cNvPr id="2" name="Title 1">
+          <p:cNvPr id="5" name="Title 4">
             <a:extLst>
               <a:ext uri="{FF2B5EF4-FFF2-40B4-BE49-F238E27FC236}">
-                <a16:creationId xmlns:a16="http://schemas.microsoft.com/office/drawing/2014/main" id="{648E65E8-B015-4E9C-A89D-C6BFB921BD89}"/>
+                <a16:creationId xmlns:a16="http://schemas.microsoft.com/office/drawing/2014/main" id="{02D6B9C9-540E-492E-B334-8538D528D3E5}"/>
               </a:ext>
             </a:extLst>
           </p:cNvPr>
@@ -11684,21 +11952,31 @@
             <p:ph type="title"/>
           </p:nvPr>
         </p:nvSpPr>
-        <p:spPr/>
+        <p:spPr>
+          <a:xfrm>
+            <a:off x="677334" y="396950"/>
+            <a:ext cx="8596668" cy="361506"/>
+          </a:xfrm>
+        </p:spPr>
         <p:txBody>
-          <a:bodyPr/>
+          <a:bodyPr>
+            <a:normAutofit fontScale="90000"/>
+          </a:bodyPr>
           <a:lstStyle/>
           <a:p>
-            <a:endParaRPr lang="en-GB"/>
+            <a:r>
+              <a:rPr lang="en-GB" sz="2000" dirty="0"/>
+              <a:t>Cucumber : Runner Class</a:t>
+            </a:r>
           </a:p>
         </p:txBody>
       </p:sp>
       <p:sp>
         <p:nvSpPr>
-          <p:cNvPr id="3" name="Content Placeholder 2">
+          <p:cNvPr id="7" name="Content Placeholder 6">
             <a:extLst>
               <a:ext uri="{FF2B5EF4-FFF2-40B4-BE49-F238E27FC236}">
-                <a16:creationId xmlns:a16="http://schemas.microsoft.com/office/drawing/2014/main" id="{4B68C69B-68A9-40F9-98DF-8991E6AA1CEA}"/>
+                <a16:creationId xmlns:a16="http://schemas.microsoft.com/office/drawing/2014/main" id="{E46AA8D0-A358-4388-AF29-ABDC7E4C0C46}"/>
               </a:ext>
             </a:extLst>
           </p:cNvPr>
@@ -11709,19 +11987,236 @@
             <p:ph idx="1"/>
           </p:nvPr>
         </p:nvSpPr>
-        <p:spPr/>
+        <p:spPr>
+          <a:xfrm>
+            <a:off x="677334" y="893135"/>
+            <a:ext cx="8596668" cy="5869172"/>
+          </a:xfrm>
+        </p:spPr>
         <p:txBody>
-          <a:bodyPr/>
+          <a:bodyPr>
+            <a:normAutofit fontScale="92500" lnSpcReduction="20000"/>
+          </a:bodyPr>
           <a:lstStyle/>
           <a:p>
-            <a:endParaRPr lang="en-GB"/>
+            <a:pPr fontAlgn="base"/>
+            <a:r>
+              <a:rPr lang="en-GB" dirty="0"/>
+              <a:t>What is the Cucumber Test Runner class?</a:t>
+            </a:r>
+          </a:p>
+          <a:p>
+            <a:pPr lvl="1" fontAlgn="base"/>
+            <a:r>
+              <a:rPr lang="en-GB" dirty="0"/>
+              <a:t>A mechanism/class used to run Cucumber tests</a:t>
+            </a:r>
+          </a:p>
+          <a:p>
+            <a:pPr lvl="1" fontAlgn="base"/>
+            <a:r>
+              <a:rPr lang="en-GB" dirty="0"/>
+              <a:t>It’s a class using which we can configure Cucumber test runs</a:t>
+            </a:r>
+          </a:p>
+          <a:p>
+            <a:pPr lvl="1" fontAlgn="base"/>
+            <a:r>
+              <a:rPr lang="en-GB" dirty="0"/>
+              <a:t>@</a:t>
+            </a:r>
+            <a:r>
+              <a:rPr lang="en-GB" dirty="0" err="1"/>
+              <a:t>CucumberOptions</a:t>
+            </a:r>
+            <a:endParaRPr lang="en-GB" dirty="0"/>
+          </a:p>
+          <a:p>
+            <a:pPr lvl="2" fontAlgn="base"/>
+            <a:r>
+              <a:rPr lang="en-GB" dirty="0"/>
+              <a:t>Features</a:t>
+            </a:r>
+          </a:p>
+          <a:p>
+            <a:pPr lvl="3" fontAlgn="base"/>
+            <a:r>
+              <a:rPr lang="en-GB" dirty="0"/>
+              <a:t>Folder location where feature files are present</a:t>
+            </a:r>
+          </a:p>
+          <a:p>
+            <a:pPr lvl="2" fontAlgn="base"/>
+            <a:r>
+              <a:rPr lang="en-GB" dirty="0"/>
+              <a:t>Glue</a:t>
+            </a:r>
+          </a:p>
+          <a:p>
+            <a:pPr lvl="3" fontAlgn="base"/>
+            <a:r>
+              <a:rPr lang="en-GB" dirty="0"/>
+              <a:t>Package locations where Step definitions and hooks are picked</a:t>
+            </a:r>
+          </a:p>
+          <a:p>
+            <a:pPr lvl="2" fontAlgn="base"/>
+            <a:r>
+              <a:rPr lang="en-GB" dirty="0"/>
+              <a:t>Plugin</a:t>
+            </a:r>
+          </a:p>
+          <a:p>
+            <a:pPr lvl="3" fontAlgn="base"/>
+            <a:r>
+              <a:rPr lang="en-GB" dirty="0"/>
+              <a:t>Html:&lt;location&gt; =&gt; Generates html report</a:t>
+            </a:r>
+          </a:p>
+          <a:p>
+            <a:pPr lvl="3" fontAlgn="base"/>
+            <a:r>
+              <a:rPr lang="en-GB" dirty="0"/>
+              <a:t>Json:&lt;location&gt; =&gt; </a:t>
+            </a:r>
+            <a:r>
+              <a:rPr lang="en-GB" dirty="0" err="1"/>
+              <a:t>Geneartes</a:t>
+            </a:r>
+            <a:r>
+              <a:rPr lang="en-GB" dirty="0"/>
+              <a:t> .json file which contains test execution details</a:t>
+            </a:r>
+          </a:p>
+          <a:p>
+            <a:pPr lvl="3" fontAlgn="base"/>
+            <a:r>
+              <a:rPr lang="en-GB" dirty="0"/>
+              <a:t>Pretty</a:t>
+            </a:r>
+          </a:p>
+          <a:p>
+            <a:pPr lvl="2" fontAlgn="base"/>
+            <a:r>
+              <a:rPr lang="en-GB" dirty="0"/>
+              <a:t>Tags</a:t>
+            </a:r>
+          </a:p>
+          <a:p>
+            <a:pPr lvl="3" fontAlgn="base"/>
+            <a:r>
+              <a:rPr lang="en-GB" dirty="0"/>
+              <a:t>Provide tag names =&gt; Only scenarios with these tags are executed</a:t>
+            </a:r>
+          </a:p>
+          <a:p>
+            <a:pPr lvl="4" fontAlgn="base"/>
+            <a:r>
+              <a:rPr lang="en-GB" dirty="0"/>
+              <a:t>@</a:t>
+            </a:r>
+            <a:r>
+              <a:rPr lang="en-GB" dirty="0" err="1"/>
+              <a:t>SmokeTest</a:t>
+            </a:r>
+            <a:endParaRPr lang="en-GB" dirty="0"/>
+          </a:p>
+          <a:p>
+            <a:pPr lvl="4" fontAlgn="base"/>
+            <a:r>
+              <a:rPr lang="en-GB" dirty="0"/>
+              <a:t>@</a:t>
+            </a:r>
+            <a:r>
+              <a:rPr lang="en-GB" dirty="0" err="1"/>
+              <a:t>SystemTest</a:t>
+            </a:r>
+            <a:endParaRPr lang="en-GB" dirty="0"/>
+          </a:p>
+          <a:p>
+            <a:pPr lvl="4" fontAlgn="base"/>
+            <a:r>
+              <a:rPr lang="en-GB" dirty="0"/>
+              <a:t>@</a:t>
+            </a:r>
+            <a:r>
+              <a:rPr lang="en-GB" dirty="0" err="1"/>
+              <a:t>SmokeTest</a:t>
+            </a:r>
+            <a:r>
+              <a:rPr lang="en-GB" dirty="0"/>
+              <a:t> and @</a:t>
+            </a:r>
+            <a:r>
+              <a:rPr lang="en-GB" dirty="0" err="1"/>
+              <a:t>SystemTest</a:t>
+            </a:r>
+            <a:endParaRPr lang="en-GB" dirty="0"/>
+          </a:p>
+          <a:p>
+            <a:pPr lvl="4" fontAlgn="base"/>
+            <a:r>
+              <a:rPr lang="en-GB" dirty="0"/>
+              <a:t>@</a:t>
+            </a:r>
+            <a:r>
+              <a:rPr lang="en-GB" dirty="0" err="1"/>
+              <a:t>SmokeTest</a:t>
+            </a:r>
+            <a:r>
+              <a:rPr lang="en-GB" dirty="0"/>
+              <a:t> or @</a:t>
+            </a:r>
+            <a:r>
+              <a:rPr lang="en-GB" dirty="0" err="1"/>
+              <a:t>SystemTest</a:t>
+            </a:r>
+            <a:endParaRPr lang="en-GB" dirty="0"/>
+          </a:p>
+          <a:p>
+            <a:pPr lvl="4" fontAlgn="base"/>
+            <a:r>
+              <a:rPr lang="en-GB" dirty="0"/>
+              <a:t>@</a:t>
+            </a:r>
+            <a:r>
+              <a:rPr lang="en-GB" dirty="0" err="1"/>
+              <a:t>SmokeTest</a:t>
+            </a:r>
+            <a:r>
+              <a:rPr lang="en-GB" dirty="0"/>
+              <a:t> and not @</a:t>
+            </a:r>
+            <a:r>
+              <a:rPr lang="en-GB" dirty="0" err="1"/>
+              <a:t>SystemTest</a:t>
+            </a:r>
+            <a:endParaRPr lang="en-GB" sz="1200" dirty="0"/>
+          </a:p>
+          <a:p>
+            <a:pPr lvl="2"/>
+            <a:r>
+              <a:rPr lang="en-GB" dirty="0"/>
+              <a:t>Monochrome = true</a:t>
+            </a:r>
+          </a:p>
+          <a:p>
+            <a:pPr lvl="3"/>
+            <a:r>
+              <a:rPr lang="en-GB" dirty="0" err="1"/>
+              <a:t>Humn</a:t>
+            </a:r>
+            <a:r>
+              <a:rPr lang="en-GB" dirty="0"/>
+              <a:t> readable console output</a:t>
+            </a:r>
           </a:p>
         </p:txBody>
       </p:sp>
     </p:spTree>
     <p:extLst>
       <p:ext uri="{BB962C8B-B14F-4D97-AF65-F5344CB8AC3E}">
-        <p14:creationId xmlns:p14="http://schemas.microsoft.com/office/powerpoint/2010/main" val="3040186217"/>
+        <p14:creationId xmlns:p14="http://schemas.microsoft.com/office/powerpoint/2010/main" val="3364840249"/>
       </p:ext>
     </p:extLst>
   </p:cSld>

</xml_diff>